<commit_message>
[FIX] typos on session 8 T slides
</commit_message>
<xml_diff>
--- a/materials/session8/T/ML-Session8-T.pptx
+++ b/materials/session8/T/ML-Session8-T.pptx
@@ -146,6 +146,7 @@
 <p1510:revInfo xmlns:a="http://schemas.openxmlformats.org/drawingml/2006/main" xmlns:r="http://schemas.openxmlformats.org/officeDocument/2006/relationships" xmlns:p1510="http://schemas.microsoft.com/office/powerpoint/2015/10/main">
   <p1510:revLst>
     <p1510:client id="{5A33F3AB-40EA-3034-9B62-34E2DF32D383}" v="2621" dt="2024-03-03T22:35:33.691"/>
+    <p1510:client id="{7FEBBDDE-F470-0968-914D-77AC4449ECDF}" v="28" dt="2024-03-05T17:29:07.861"/>
     <p1510:client id="{9DCCD8EA-3406-805E-9744-9E61A031B35A}" v="246" dt="2024-03-03T22:47:18.516"/>
   </p1510:revLst>
 </p1510:revInfo>
@@ -280,7 +281,7 @@
           <a:p>
             <a:fld id="{E431C0BB-DC71-4713-A787-95011EDB8CA8}" type="datetimeFigureOut">
               <a:rPr lang="pt-PT" smtClean="0"/>
-              <a:t>04/03/2024</a:t>
+              <a:t>05/03/2024</a:t>
             </a:fld>
             <a:endParaRPr lang="pt-PT"/>
           </a:p>
@@ -448,7 +449,7 @@
           <a:p>
             <a:fld id="{E431C0BB-DC71-4713-A787-95011EDB8CA8}" type="datetimeFigureOut">
               <a:rPr lang="pt-PT" smtClean="0"/>
-              <a:t>04/03/2024</a:t>
+              <a:t>05/03/2024</a:t>
             </a:fld>
             <a:endParaRPr lang="pt-PT"/>
           </a:p>
@@ -626,7 +627,7 @@
           <a:p>
             <a:fld id="{E431C0BB-DC71-4713-A787-95011EDB8CA8}" type="datetimeFigureOut">
               <a:rPr lang="pt-PT" smtClean="0"/>
-              <a:t>04/03/2024</a:t>
+              <a:t>05/03/2024</a:t>
             </a:fld>
             <a:endParaRPr lang="pt-PT"/>
           </a:p>
@@ -794,7 +795,7 @@
           <a:p>
             <a:fld id="{E431C0BB-DC71-4713-A787-95011EDB8CA8}" type="datetimeFigureOut">
               <a:rPr lang="pt-PT" smtClean="0"/>
-              <a:t>04/03/2024</a:t>
+              <a:t>05/03/2024</a:t>
             </a:fld>
             <a:endParaRPr lang="pt-PT"/>
           </a:p>
@@ -1039,7 +1040,7 @@
           <a:p>
             <a:fld id="{E431C0BB-DC71-4713-A787-95011EDB8CA8}" type="datetimeFigureOut">
               <a:rPr lang="pt-PT" smtClean="0"/>
-              <a:t>04/03/2024</a:t>
+              <a:t>05/03/2024</a:t>
             </a:fld>
             <a:endParaRPr lang="pt-PT"/>
           </a:p>
@@ -1268,7 +1269,7 @@
           <a:p>
             <a:fld id="{E431C0BB-DC71-4713-A787-95011EDB8CA8}" type="datetimeFigureOut">
               <a:rPr lang="pt-PT" smtClean="0"/>
-              <a:t>04/03/2024</a:t>
+              <a:t>05/03/2024</a:t>
             </a:fld>
             <a:endParaRPr lang="pt-PT"/>
           </a:p>
@@ -1632,7 +1633,7 @@
           <a:p>
             <a:fld id="{E431C0BB-DC71-4713-A787-95011EDB8CA8}" type="datetimeFigureOut">
               <a:rPr lang="pt-PT" smtClean="0"/>
-              <a:t>04/03/2024</a:t>
+              <a:t>05/03/2024</a:t>
             </a:fld>
             <a:endParaRPr lang="pt-PT"/>
           </a:p>
@@ -1749,7 +1750,7 @@
           <a:p>
             <a:fld id="{E431C0BB-DC71-4713-A787-95011EDB8CA8}" type="datetimeFigureOut">
               <a:rPr lang="pt-PT" smtClean="0"/>
-              <a:t>04/03/2024</a:t>
+              <a:t>05/03/2024</a:t>
             </a:fld>
             <a:endParaRPr lang="pt-PT"/>
           </a:p>
@@ -1844,7 +1845,7 @@
           <a:p>
             <a:fld id="{E431C0BB-DC71-4713-A787-95011EDB8CA8}" type="datetimeFigureOut">
               <a:rPr lang="pt-PT" smtClean="0"/>
-              <a:t>04/03/2024</a:t>
+              <a:t>05/03/2024</a:t>
             </a:fld>
             <a:endParaRPr lang="pt-PT"/>
           </a:p>
@@ -2119,7 +2120,7 @@
           <a:p>
             <a:fld id="{E431C0BB-DC71-4713-A787-95011EDB8CA8}" type="datetimeFigureOut">
               <a:rPr lang="pt-PT" smtClean="0"/>
-              <a:t>04/03/2024</a:t>
+              <a:t>05/03/2024</a:t>
             </a:fld>
             <a:endParaRPr lang="pt-PT"/>
           </a:p>
@@ -2371,7 +2372,7 @@
           <a:p>
             <a:fld id="{E431C0BB-DC71-4713-A787-95011EDB8CA8}" type="datetimeFigureOut">
               <a:rPr lang="pt-PT" smtClean="0"/>
-              <a:t>04/03/2024</a:t>
+              <a:t>05/03/2024</a:t>
             </a:fld>
             <a:endParaRPr lang="pt-PT"/>
           </a:p>
@@ -2582,7 +2583,7 @@
           <a:p>
             <a:fld id="{E431C0BB-DC71-4713-A787-95011EDB8CA8}" type="datetimeFigureOut">
               <a:rPr lang="pt-PT" smtClean="0"/>
-              <a:t>04/03/2024</a:t>
+              <a:t>05/03/2024</a:t>
             </a:fld>
             <a:endParaRPr lang="pt-PT"/>
           </a:p>
@@ -15350,14 +15351,14 @@
           <a:p>
             <a:pPr algn="just"/>
             <a:r>
-              <a:rPr lang="pt-PT" b="1" err="1">
+              <a:rPr lang="pt-PT" b="1" dirty="0" err="1">
                 <a:solidFill>
                   <a:schemeClr val="tx2"/>
                 </a:solidFill>
                 <a:ea typeface="+mn-lt"/>
                 <a:cs typeface="+mn-lt"/>
               </a:rPr>
-              <a:t>Precision</a:t>
+              <a:t>Accuracy</a:t>
             </a:r>
             <a:r>
               <a:rPr lang="pt-PT" b="1" dirty="0">
@@ -15380,7 +15381,7 @@
               <a:t> general </a:t>
             </a:r>
             <a:r>
-              <a:rPr lang="pt-PT" err="1">
+              <a:rPr lang="pt-PT" dirty="0" err="1">
                 <a:solidFill>
                   <a:srgbClr val="000000"/>
                 </a:solidFill>
@@ -15400,7 +15401,7 @@
               <a:t> </a:t>
             </a:r>
             <a:r>
-              <a:rPr lang="pt-PT" err="1">
+              <a:rPr lang="pt-PT" dirty="0" err="1">
                 <a:solidFill>
                   <a:srgbClr val="000000"/>
                 </a:solidFill>
@@ -15420,7 +15421,7 @@
               <a:t> </a:t>
             </a:r>
             <a:r>
-              <a:rPr lang="pt-PT" err="1">
+              <a:rPr lang="pt-PT" dirty="0" err="1">
                 <a:solidFill>
                   <a:srgbClr val="000000"/>
                 </a:solidFill>
@@ -15440,7 +15441,7 @@
               <a:t> </a:t>
             </a:r>
             <a:r>
-              <a:rPr lang="pt-PT" err="1">
+              <a:rPr lang="pt-PT" dirty="0" err="1">
                 <a:solidFill>
                   <a:srgbClr val="000000"/>
                 </a:solidFill>
@@ -15470,7 +15471,7 @@
               <a:t>classes are </a:t>
             </a:r>
             <a:r>
-              <a:rPr lang="pt-PT" b="1" err="1">
+              <a:rPr lang="pt-PT" b="1" dirty="0" err="1">
                 <a:solidFill>
                   <a:schemeClr val="tx2"/>
                 </a:solidFill>
@@ -15490,7 +15491,7 @@
               <a:t> </a:t>
             </a:r>
             <a:r>
-              <a:rPr lang="pt-PT" err="1">
+              <a:rPr lang="pt-PT" dirty="0" err="1">
                 <a:solidFill>
                   <a:srgbClr val="000000"/>
                 </a:solidFill>
@@ -15510,7 +15511,7 @@
               <a:t> </a:t>
             </a:r>
             <a:r>
-              <a:rPr lang="pt-PT" err="1">
+              <a:rPr lang="pt-PT" dirty="0" err="1">
                 <a:solidFill>
                   <a:srgbClr val="000000"/>
                 </a:solidFill>
@@ -15530,7 +15531,7 @@
               <a:t> </a:t>
             </a:r>
             <a:r>
-              <a:rPr lang="pt-PT" err="1">
+              <a:rPr lang="pt-PT" dirty="0" err="1">
                 <a:solidFill>
                   <a:srgbClr val="000000"/>
                 </a:solidFill>
@@ -15550,7 +15551,7 @@
               <a:t> </a:t>
             </a:r>
             <a:r>
-              <a:rPr lang="pt-PT" err="1">
+              <a:rPr lang="pt-PT" dirty="0" err="1">
                 <a:solidFill>
                   <a:srgbClr val="000000"/>
                 </a:solidFill>
@@ -15570,7 +15571,7 @@
               <a:t> positive </a:t>
             </a:r>
             <a:r>
-              <a:rPr lang="pt-PT" err="1">
+              <a:rPr lang="pt-PT" dirty="0" err="1">
                 <a:solidFill>
                   <a:srgbClr val="000000"/>
                 </a:solidFill>
@@ -15590,7 +15591,7 @@
               <a:t> negative cases are </a:t>
             </a:r>
             <a:r>
-              <a:rPr lang="pt-PT" err="1">
+              <a:rPr lang="pt-PT" dirty="0" err="1">
                 <a:solidFill>
                   <a:srgbClr val="000000"/>
                 </a:solidFill>
@@ -15610,7 +15611,7 @@
               <a:t> </a:t>
             </a:r>
             <a:r>
-              <a:rPr lang="pt-PT" err="1">
+              <a:rPr lang="pt-PT" dirty="0" err="1">
                 <a:solidFill>
                   <a:srgbClr val="000000"/>
                 </a:solidFill>
@@ -42664,17 +42665,17 @@
           <a:lstStyle/>
           <a:p>
             <a:r>
-              <a:rPr lang="pt-PT" sz="3600" b="1" err="1">
+              <a:rPr lang="pt-PT" sz="3600" b="1" dirty="0" err="1">
                 <a:solidFill>
                   <a:srgbClr val="092953"/>
                 </a:solidFill>
                 <a:latin typeface="Cambria"/>
                 <a:ea typeface="Cambria"/>
               </a:rPr>
-              <a:t>Binary</a:t>
-            </a:r>
-            <a:r>
-              <a:rPr lang="pt-PT" sz="3600" b="1">
+              <a:t>Multiclass</a:t>
+            </a:r>
+            <a:r>
+              <a:rPr lang="pt-PT" sz="3600" b="1" dirty="0">
                 <a:solidFill>
                   <a:srgbClr val="092953"/>
                 </a:solidFill>
@@ -42684,7 +42685,7 @@
               <a:t> </a:t>
             </a:r>
             <a:r>
-              <a:rPr lang="pt-PT" sz="3600" b="1" err="1">
+              <a:rPr lang="pt-PT" sz="3600" b="1" dirty="0" err="1">
                 <a:solidFill>
                   <a:srgbClr val="092953"/>
                 </a:solidFill>
@@ -45839,34 +45840,14 @@
           <a:lstStyle/>
           <a:p>
             <a:r>
-              <a:rPr lang="pt-PT" sz="3600" b="1" err="1">
+              <a:rPr lang="pt-PT" sz="3600" b="1" dirty="0" err="1">
                 <a:solidFill>
                   <a:srgbClr val="092953"/>
                 </a:solidFill>
                 <a:latin typeface="Cambria"/>
                 <a:ea typeface="Cambria"/>
               </a:rPr>
-              <a:t>Binary</a:t>
-            </a:r>
-            <a:r>
-              <a:rPr lang="pt-PT" sz="3600" b="1">
-                <a:solidFill>
-                  <a:srgbClr val="092953"/>
-                </a:solidFill>
-                <a:latin typeface="Cambria"/>
-                <a:ea typeface="Cambria"/>
-              </a:rPr>
-              <a:t> </a:t>
-            </a:r>
-            <a:r>
-              <a:rPr lang="pt-PT" sz="3600" b="1" err="1">
-                <a:solidFill>
-                  <a:srgbClr val="092953"/>
-                </a:solidFill>
-                <a:latin typeface="Cambria"/>
-                <a:ea typeface="Cambria"/>
-              </a:rPr>
-              <a:t>Classification</a:t>
+              <a:t>Regression</a:t>
             </a:r>
           </a:p>
         </p:txBody>

</xml_diff>